<commit_message>
Restructured Project, spark initialize
</commit_message>
<xml_diff>
--- a/documents/[Nssu]Flow_Chart.pptx
+++ b/documents/[Nssu]Flow_Chart.pptx
@@ -5,10 +5,11 @@
     <p:sldMasterId id="2147483648" r:id="rId1"/>
   </p:sldMasterIdLst>
   <p:notesMasterIdLst>
-    <p:notesMasterId r:id="rId3"/>
+    <p:notesMasterId r:id="rId4"/>
   </p:notesMasterIdLst>
   <p:sldIdLst>
     <p:sldId id="256" r:id="rId2"/>
+    <p:sldId id="257" r:id="rId3"/>
   </p:sldIdLst>
   <p:sldSz cx="12192000" cy="6858000"/>
   <p:notesSz cx="6858000" cy="9144000"/>
@@ -107,6 +108,11 @@
       </a:defRPr>
     </a:lvl9pPr>
   </p:defaultTextStyle>
+  <p:extLst>
+    <p:ext uri="{EFAFB233-063F-42B5-8137-9DF3F51BA10A}">
+      <p15:sldGuideLst xmlns:p15="http://schemas.microsoft.com/office/powerpoint/2012/main"/>
+    </p:ext>
+  </p:extLst>
 </p:presentation>
 </file>
 
@@ -192,7 +198,7 @@
           <a:p>
             <a:fld id="{72FA41E3-35FE-B34E-8963-FECA01273305}" type="datetimeFigureOut">
               <a:rPr kumimoji="1" lang="ko-KR" altLang="en-US" smtClean="0"/>
-              <a:t>2018. 5. 29.</a:t>
+              <a:t>2018. 5. 30.</a:t>
             </a:fld>
             <a:endParaRPr kumimoji="1" lang="ko-KR" altLang="en-US"/>
           </a:p>
@@ -518,6 +524,90 @@
 </p:notes>
 </file>
 
+<file path=ppt/notesSlides/notesSlide2.xml><?xml version="1.0" encoding="utf-8"?>
+<p:notes xmlns:a="http://schemas.openxmlformats.org/drawingml/2006/main" xmlns:r="http://schemas.openxmlformats.org/officeDocument/2006/relationships" xmlns:p="http://schemas.openxmlformats.org/presentationml/2006/main">
+  <p:cSld>
+    <p:spTree>
+      <p:nvGrpSpPr>
+        <p:cNvPr id="1" name=""/>
+        <p:cNvGrpSpPr/>
+        <p:nvPr/>
+      </p:nvGrpSpPr>
+      <p:grpSpPr>
+        <a:xfrm>
+          <a:off x="0" y="0"/>
+          <a:ext cx="0" cy="0"/>
+          <a:chOff x="0" y="0"/>
+          <a:chExt cx="0" cy="0"/>
+        </a:xfrm>
+      </p:grpSpPr>
+      <p:sp>
+        <p:nvSpPr>
+          <p:cNvPr id="2" name="슬라이드 이미지 개체 틀 1"/>
+          <p:cNvSpPr>
+            <a:spLocks noGrp="1" noRot="1" noChangeAspect="1"/>
+          </p:cNvSpPr>
+          <p:nvPr>
+            <p:ph type="sldImg"/>
+          </p:nvPr>
+        </p:nvSpPr>
+        <p:spPr/>
+      </p:sp>
+      <p:sp>
+        <p:nvSpPr>
+          <p:cNvPr id="3" name="슬라이드 노트 개체 틀 2"/>
+          <p:cNvSpPr>
+            <a:spLocks noGrp="1"/>
+          </p:cNvSpPr>
+          <p:nvPr>
+            <p:ph type="body" idx="1"/>
+          </p:nvPr>
+        </p:nvSpPr>
+        <p:spPr/>
+        <p:txBody>
+          <a:bodyPr/>
+          <a:lstStyle/>
+          <a:p>
+            <a:endParaRPr kumimoji="1" lang="ko-KR" altLang="en-US" dirty="0"/>
+          </a:p>
+        </p:txBody>
+      </p:sp>
+      <p:sp>
+        <p:nvSpPr>
+          <p:cNvPr id="4" name="슬라이드 번호 개체 틀 3"/>
+          <p:cNvSpPr>
+            <a:spLocks noGrp="1"/>
+          </p:cNvSpPr>
+          <p:nvPr>
+            <p:ph type="sldNum" sz="quarter" idx="10"/>
+          </p:nvPr>
+        </p:nvSpPr>
+        <p:spPr/>
+        <p:txBody>
+          <a:bodyPr/>
+          <a:lstStyle/>
+          <a:p>
+            <a:fld id="{9AFCF631-9364-9042-ADF8-C1C986832218}" type="slidenum">
+              <a:rPr kumimoji="1" lang="ko-KR" altLang="en-US" smtClean="0"/>
+              <a:t>2</a:t>
+            </a:fld>
+            <a:endParaRPr kumimoji="1" lang="ko-KR" altLang="en-US"/>
+          </a:p>
+        </p:txBody>
+      </p:sp>
+    </p:spTree>
+    <p:extLst>
+      <p:ext uri="{BB962C8B-B14F-4D97-AF65-F5344CB8AC3E}">
+        <p14:creationId xmlns:p14="http://schemas.microsoft.com/office/powerpoint/2010/main" val="1183591177"/>
+      </p:ext>
+    </p:extLst>
+  </p:cSld>
+  <p:clrMapOvr>
+    <a:masterClrMapping/>
+  </p:clrMapOvr>
+</p:notes>
+</file>
+
 <file path=ppt/slideLayouts/slideLayout1.xml><?xml version="1.0" encoding="utf-8"?>
 <p:sldLayout xmlns:a="http://schemas.openxmlformats.org/drawingml/2006/main" xmlns:r="http://schemas.openxmlformats.org/officeDocument/2006/relationships" xmlns:p="http://schemas.openxmlformats.org/presentationml/2006/main" type="title" preserve="1">
   <p:cSld name="제목 슬라이드">
@@ -665,7 +755,7 @@
           <a:p>
             <a:fld id="{4C575798-5F6B-0D4E-AC16-0D95E8342744}" type="datetimeFigureOut">
               <a:rPr kumimoji="1" lang="ko-KR" altLang="en-US" smtClean="0"/>
-              <a:t>2018. 5. 29.</a:t>
+              <a:t>2018. 5. 30.</a:t>
             </a:fld>
             <a:endParaRPr kumimoji="1" lang="ko-KR" altLang="en-US"/>
           </a:p>
@@ -838,7 +928,7 @@
           <a:p>
             <a:fld id="{4C575798-5F6B-0D4E-AC16-0D95E8342744}" type="datetimeFigureOut">
               <a:rPr kumimoji="1" lang="ko-KR" altLang="en-US" smtClean="0"/>
-              <a:t>2018. 5. 29.</a:t>
+              <a:t>2018. 5. 30.</a:t>
             </a:fld>
             <a:endParaRPr kumimoji="1" lang="ko-KR" altLang="en-US"/>
           </a:p>
@@ -1021,7 +1111,7 @@
           <a:p>
             <a:fld id="{4C575798-5F6B-0D4E-AC16-0D95E8342744}" type="datetimeFigureOut">
               <a:rPr kumimoji="1" lang="ko-KR" altLang="en-US" smtClean="0"/>
-              <a:t>2018. 5. 29.</a:t>
+              <a:t>2018. 5. 30.</a:t>
             </a:fld>
             <a:endParaRPr kumimoji="1" lang="ko-KR" altLang="en-US"/>
           </a:p>
@@ -1194,7 +1284,7 @@
           <a:p>
             <a:fld id="{4C575798-5F6B-0D4E-AC16-0D95E8342744}" type="datetimeFigureOut">
               <a:rPr kumimoji="1" lang="ko-KR" altLang="en-US" smtClean="0"/>
-              <a:t>2018. 5. 29.</a:t>
+              <a:t>2018. 5. 30.</a:t>
             </a:fld>
             <a:endParaRPr kumimoji="1" lang="ko-KR" altLang="en-US"/>
           </a:p>
@@ -1472,7 +1562,7 @@
           <a:p>
             <a:fld id="{4C575798-5F6B-0D4E-AC16-0D95E8342744}" type="datetimeFigureOut">
               <a:rPr kumimoji="1" lang="ko-KR" altLang="en-US" smtClean="0"/>
-              <a:t>2018. 5. 29.</a:t>
+              <a:t>2018. 5. 30.</a:t>
             </a:fld>
             <a:endParaRPr kumimoji="1" lang="ko-KR" altLang="en-US"/>
           </a:p>
@@ -1687,7 +1777,7 @@
           <a:p>
             <a:fld id="{4C575798-5F6B-0D4E-AC16-0D95E8342744}" type="datetimeFigureOut">
               <a:rPr kumimoji="1" lang="ko-KR" altLang="en-US" smtClean="0"/>
-              <a:t>2018. 5. 29.</a:t>
+              <a:t>2018. 5. 30.</a:t>
             </a:fld>
             <a:endParaRPr kumimoji="1" lang="ko-KR" altLang="en-US"/>
           </a:p>
@@ -2055,7 +2145,7 @@
           <a:p>
             <a:fld id="{4C575798-5F6B-0D4E-AC16-0D95E8342744}" type="datetimeFigureOut">
               <a:rPr kumimoji="1" lang="ko-KR" altLang="en-US" smtClean="0"/>
-              <a:t>2018. 5. 29.</a:t>
+              <a:t>2018. 5. 30.</a:t>
             </a:fld>
             <a:endParaRPr kumimoji="1" lang="ko-KR" altLang="en-US"/>
           </a:p>
@@ -2196,7 +2286,7 @@
           <a:p>
             <a:fld id="{4C575798-5F6B-0D4E-AC16-0D95E8342744}" type="datetimeFigureOut">
               <a:rPr kumimoji="1" lang="ko-KR" altLang="en-US" smtClean="0"/>
-              <a:t>2018. 5. 29.</a:t>
+              <a:t>2018. 5. 30.</a:t>
             </a:fld>
             <a:endParaRPr kumimoji="1" lang="ko-KR" altLang="en-US"/>
           </a:p>
@@ -2309,7 +2399,7 @@
           <a:p>
             <a:fld id="{4C575798-5F6B-0D4E-AC16-0D95E8342744}" type="datetimeFigureOut">
               <a:rPr kumimoji="1" lang="ko-KR" altLang="en-US" smtClean="0"/>
-              <a:t>2018. 5. 29.</a:t>
+              <a:t>2018. 5. 30.</a:t>
             </a:fld>
             <a:endParaRPr kumimoji="1" lang="ko-KR" altLang="en-US"/>
           </a:p>
@@ -2598,7 +2688,7 @@
           <a:p>
             <a:fld id="{4C575798-5F6B-0D4E-AC16-0D95E8342744}" type="datetimeFigureOut">
               <a:rPr kumimoji="1" lang="ko-KR" altLang="en-US" smtClean="0"/>
-              <a:t>2018. 5. 29.</a:t>
+              <a:t>2018. 5. 30.</a:t>
             </a:fld>
             <a:endParaRPr kumimoji="1" lang="ko-KR" altLang="en-US"/>
           </a:p>
@@ -2889,7 +2979,7 @@
           <a:p>
             <a:fld id="{4C575798-5F6B-0D4E-AC16-0D95E8342744}" type="datetimeFigureOut">
               <a:rPr kumimoji="1" lang="ko-KR" altLang="en-US" smtClean="0"/>
-              <a:t>2018. 5. 29.</a:t>
+              <a:t>2018. 5. 30.</a:t>
             </a:fld>
             <a:endParaRPr kumimoji="1" lang="ko-KR" altLang="en-US"/>
           </a:p>
@@ -3105,7 +3195,7 @@
           <a:p>
             <a:fld id="{4C575798-5F6B-0D4E-AC16-0D95E8342744}" type="datetimeFigureOut">
               <a:rPr kumimoji="1" lang="ko-KR" altLang="en-US" smtClean="0"/>
-              <a:t>2018. 5. 29.</a:t>
+              <a:t>2018. 5. 30.</a:t>
             </a:fld>
             <a:endParaRPr kumimoji="1" lang="ko-KR" altLang="en-US"/>
           </a:p>
@@ -4218,7 +4308,7 @@
         <p:spPr>
           <a:xfrm>
             <a:off x="1202761" y="3462888"/>
-            <a:ext cx="1839158" cy="276999"/>
+            <a:ext cx="1898468" cy="646331"/>
           </a:xfrm>
           <a:prstGeom prst="rect">
             <a:avLst/>
@@ -4231,12 +4321,15 @@
           </a:bodyPr>
           <a:lstStyle/>
           <a:p>
+            <a:pPr marL="228600" indent="-228600">
+              <a:buAutoNum type="arabicPeriod"/>
+            </a:pPr>
             <a:r>
               <a:rPr kumimoji="1" lang="en-US" altLang="ko-KR" sz="1200" dirty="0">
                 <a:latin typeface="NanumBarunGothic" panose="020B0603020101020101" pitchFamily="34" charset="-127"/>
                 <a:ea typeface="NanumBarunGothic" panose="020B0603020101020101" pitchFamily="34" charset="-127"/>
               </a:rPr>
-              <a:t>1. Android </a:t>
+              <a:t>Android </a:t>
             </a:r>
             <a:r>
               <a:rPr kumimoji="1" lang="ko-KR" altLang="en-US" sz="1200" dirty="0">
@@ -4245,6 +4338,32 @@
               </a:rPr>
               <a:t>특정 주기 요청</a:t>
             </a:r>
+            <a:endParaRPr kumimoji="1" lang="en-US" altLang="ko-KR" sz="1200" dirty="0">
+              <a:latin typeface="NanumBarunGothic" panose="020B0603020101020101" pitchFamily="34" charset="-127"/>
+              <a:ea typeface="NanumBarunGothic" panose="020B0603020101020101" pitchFamily="34" charset="-127"/>
+            </a:endParaRPr>
+          </a:p>
+          <a:p>
+            <a:pPr marL="228600" indent="-228600">
+              <a:buAutoNum type="arabicPeriod"/>
+            </a:pPr>
+            <a:endParaRPr kumimoji="1" lang="en-US" altLang="ko-KR" sz="1200" dirty="0">
+              <a:latin typeface="NanumBarunGothic" panose="020B0603020101020101" pitchFamily="34" charset="-127"/>
+              <a:ea typeface="NanumBarunGothic" panose="020B0603020101020101" pitchFamily="34" charset="-127"/>
+            </a:endParaRPr>
+          </a:p>
+          <a:p>
+            <a:r>
+              <a:rPr kumimoji="1" lang="ko-KR" altLang="en-US" sz="1200" dirty="0">
+                <a:latin typeface="NanumBarunGothic" panose="020B0603020101020101" pitchFamily="34" charset="-127"/>
+                <a:ea typeface="NanumBarunGothic" panose="020B0603020101020101" pitchFamily="34" charset="-127"/>
+              </a:rPr>
+              <a:t>요구 데이터 인자 맞추기</a:t>
+            </a:r>
+            <a:endParaRPr kumimoji="1" lang="en-US" altLang="ko-KR" sz="1200" dirty="0">
+              <a:latin typeface="NanumBarunGothic" panose="020B0603020101020101" pitchFamily="34" charset="-127"/>
+              <a:ea typeface="NanumBarunGothic" panose="020B0603020101020101" pitchFamily="34" charset="-127"/>
+            </a:endParaRPr>
           </a:p>
         </p:txBody>
       </p:sp>
@@ -4262,7 +4381,7 @@
         </p:nvSpPr>
         <p:spPr>
           <a:xfrm>
-            <a:off x="5942463" y="3185889"/>
+            <a:off x="5942462" y="2667372"/>
             <a:ext cx="2100255" cy="276999"/>
           </a:xfrm>
           <a:prstGeom prst="rect">
@@ -4346,7 +4465,7 @@
         </p:nvSpPr>
         <p:spPr>
           <a:xfrm>
-            <a:off x="4178403" y="3816585"/>
+            <a:off x="3877507" y="3683339"/>
             <a:ext cx="2093650" cy="276999"/>
           </a:xfrm>
           <a:prstGeom prst="rect">
@@ -4405,8 +4524,8 @@
         </p:nvSpPr>
         <p:spPr>
           <a:xfrm>
-            <a:off x="8654591" y="3998688"/>
-            <a:ext cx="2324675" cy="276999"/>
+            <a:off x="8973669" y="4072823"/>
+            <a:ext cx="3373039" cy="646331"/>
           </a:xfrm>
           <a:prstGeom prst="rect">
             <a:avLst/>
@@ -4431,8 +4550,94 @@
                 <a:latin typeface="NanumBarunGothic" panose="020B0603020101020101" pitchFamily="34" charset="-127"/>
                 <a:ea typeface="NanumBarunGothic" panose="020B0603020101020101" pitchFamily="34" charset="-127"/>
               </a:rPr>
-              <a:t> 전달 인자에 따른 모델 학습 진행</a:t>
-            </a:r>
+              <a:t> 전달 인자에 따른 모델 학습 진행 </a:t>
+            </a:r>
+            <a:r>
+              <a:rPr kumimoji="1" lang="en-US" altLang="ko-KR" sz="1200" dirty="0">
+                <a:latin typeface="NanumBarunGothic" panose="020B0603020101020101" pitchFamily="34" charset="-127"/>
+                <a:ea typeface="NanumBarunGothic" panose="020B0603020101020101" pitchFamily="34" charset="-127"/>
+              </a:rPr>
+              <a:t>–</a:t>
+            </a:r>
+            <a:r>
+              <a:rPr kumimoji="1" lang="ko-KR" altLang="en-US" sz="1200" dirty="0">
+                <a:latin typeface="NanumBarunGothic" panose="020B0603020101020101" pitchFamily="34" charset="-127"/>
+                <a:ea typeface="NanumBarunGothic" panose="020B0603020101020101" pitchFamily="34" charset="-127"/>
+              </a:rPr>
+              <a:t> 시온</a:t>
+            </a:r>
+            <a:endParaRPr kumimoji="1" lang="en-US" altLang="ko-KR" sz="1200" dirty="0">
+              <a:latin typeface="NanumBarunGothic" panose="020B0603020101020101" pitchFamily="34" charset="-127"/>
+              <a:ea typeface="NanumBarunGothic" panose="020B0603020101020101" pitchFamily="34" charset="-127"/>
+            </a:endParaRPr>
+          </a:p>
+          <a:p>
+            <a:r>
+              <a:rPr kumimoji="1" lang="ko-KR" altLang="en-US" sz="1200" dirty="0">
+                <a:latin typeface="NanumBarunGothic" panose="020B0603020101020101" pitchFamily="34" charset="-127"/>
+                <a:ea typeface="NanumBarunGothic" panose="020B0603020101020101" pitchFamily="34" charset="-127"/>
+              </a:rPr>
+              <a:t>모델 학습 불가능할 경우</a:t>
+            </a:r>
+            <a:r>
+              <a:rPr kumimoji="1" lang="en-US" altLang="ko-KR" sz="1200" dirty="0">
+                <a:latin typeface="NanumBarunGothic" panose="020B0603020101020101" pitchFamily="34" charset="-127"/>
+                <a:ea typeface="NanumBarunGothic" panose="020B0603020101020101" pitchFamily="34" charset="-127"/>
+              </a:rPr>
+              <a:t>,</a:t>
+            </a:r>
+            <a:r>
+              <a:rPr kumimoji="1" lang="ko-KR" altLang="en-US" sz="1200" dirty="0">
+                <a:latin typeface="NanumBarunGothic" panose="020B0603020101020101" pitchFamily="34" charset="-127"/>
+                <a:ea typeface="NanumBarunGothic" panose="020B0603020101020101" pitchFamily="34" charset="-127"/>
+              </a:rPr>
+              <a:t> 임의 </a:t>
+            </a:r>
+            <a:r>
+              <a:rPr kumimoji="1" lang="ko-KR" altLang="en-US" sz="1200" dirty="0" err="1">
+                <a:latin typeface="NanumBarunGothic" panose="020B0603020101020101" pitchFamily="34" charset="-127"/>
+                <a:ea typeface="NanumBarunGothic" panose="020B0603020101020101" pitchFamily="34" charset="-127"/>
+              </a:rPr>
+              <a:t>카테고리별</a:t>
+            </a:r>
+            <a:r>
+              <a:rPr kumimoji="1" lang="ko-KR" altLang="en-US" sz="1200" dirty="0">
+                <a:latin typeface="NanumBarunGothic" panose="020B0603020101020101" pitchFamily="34" charset="-127"/>
+                <a:ea typeface="NanumBarunGothic" panose="020B0603020101020101" pitchFamily="34" charset="-127"/>
+              </a:rPr>
+              <a:t> 분류 진행</a:t>
+            </a:r>
+            <a:endParaRPr kumimoji="1" lang="en-US" altLang="ko-KR" sz="1200" dirty="0">
+              <a:latin typeface="NanumBarunGothic" panose="020B0603020101020101" pitchFamily="34" charset="-127"/>
+              <a:ea typeface="NanumBarunGothic" panose="020B0603020101020101" pitchFamily="34" charset="-127"/>
+            </a:endParaRPr>
+          </a:p>
+          <a:p>
+            <a:r>
+              <a:rPr kumimoji="1" lang="en-US" altLang="ko-KR" sz="1200" dirty="0">
+                <a:latin typeface="NanumBarunGothic" panose="020B0603020101020101" pitchFamily="34" charset="-127"/>
+                <a:ea typeface="NanumBarunGothic" panose="020B0603020101020101" pitchFamily="34" charset="-127"/>
+              </a:rPr>
+              <a:t>-&gt;</a:t>
+            </a:r>
+            <a:r>
+              <a:rPr kumimoji="1" lang="ko-KR" altLang="en-US" sz="1200" dirty="0">
+                <a:latin typeface="NanumBarunGothic" panose="020B0603020101020101" pitchFamily="34" charset="-127"/>
+                <a:ea typeface="NanumBarunGothic" panose="020B0603020101020101" pitchFamily="34" charset="-127"/>
+              </a:rPr>
+              <a:t> </a:t>
+            </a:r>
+            <a:r>
+              <a:rPr kumimoji="1" lang="en-US" altLang="ko-KR" sz="1200" dirty="0">
+                <a:latin typeface="NanumBarunGothic" panose="020B0603020101020101" pitchFamily="34" charset="-127"/>
+                <a:ea typeface="NanumBarunGothic" panose="020B0603020101020101" pitchFamily="34" charset="-127"/>
+              </a:rPr>
+              <a:t>Blind</a:t>
+            </a:r>
+            <a:endParaRPr kumimoji="1" lang="ko-KR" altLang="en-US" sz="1200" dirty="0">
+              <a:latin typeface="NanumBarunGothic" panose="020B0603020101020101" pitchFamily="34" charset="-127"/>
+              <a:ea typeface="NanumBarunGothic" panose="020B0603020101020101" pitchFamily="34" charset="-127"/>
+            </a:endParaRPr>
           </a:p>
         </p:txBody>
       </p:sp>
@@ -4451,7 +4656,7 @@
         <p:spPr>
           <a:xfrm>
             <a:off x="7734307" y="5405788"/>
-            <a:ext cx="1840568" cy="276999"/>
+            <a:ext cx="2165978" cy="646331"/>
           </a:xfrm>
           <a:prstGeom prst="rect">
             <a:avLst/>
@@ -4477,6 +4682,46 @@
                 <a:ea typeface="NanumBarunGothic" panose="020B0603020101020101" pitchFamily="34" charset="-127"/>
               </a:rPr>
               <a:t> 모델을 통한 결과값 저장</a:t>
+            </a:r>
+            <a:endParaRPr kumimoji="1" lang="en-US" altLang="ko-KR" sz="1200" dirty="0">
+              <a:latin typeface="NanumBarunGothic" panose="020B0603020101020101" pitchFamily="34" charset="-127"/>
+              <a:ea typeface="NanumBarunGothic" panose="020B0603020101020101" pitchFamily="34" charset="-127"/>
+            </a:endParaRPr>
+          </a:p>
+          <a:p>
+            <a:endParaRPr kumimoji="1" lang="en-US" altLang="ko-KR" sz="1200" dirty="0">
+              <a:latin typeface="NanumBarunGothic" panose="020B0603020101020101" pitchFamily="34" charset="-127"/>
+              <a:ea typeface="NanumBarunGothic" panose="020B0603020101020101" pitchFamily="34" charset="-127"/>
+            </a:endParaRPr>
+          </a:p>
+          <a:p>
+            <a:r>
+              <a:rPr kumimoji="1" lang="en-US" altLang="ko-KR" sz="1200" dirty="0">
+                <a:latin typeface="NanumBarunGothic" panose="020B0603020101020101" pitchFamily="34" charset="-127"/>
+                <a:ea typeface="NanumBarunGothic" panose="020B0603020101020101" pitchFamily="34" charset="-127"/>
+              </a:rPr>
+              <a:t>* JSP – JDBC</a:t>
+            </a:r>
+            <a:r>
+              <a:rPr kumimoji="1" lang="ko-KR" altLang="en-US" sz="1200" dirty="0">
+                <a:latin typeface="NanumBarunGothic" panose="020B0603020101020101" pitchFamily="34" charset="-127"/>
+                <a:ea typeface="NanumBarunGothic" panose="020B0603020101020101" pitchFamily="34" charset="-127"/>
+              </a:rPr>
+              <a:t> 사용 필요 </a:t>
+            </a:r>
+            <a:r>
+              <a:rPr kumimoji="1" lang="en-US" altLang="ko-KR" sz="1200" dirty="0">
+                <a:latin typeface="NanumBarunGothic" panose="020B0603020101020101" pitchFamily="34" charset="-127"/>
+                <a:ea typeface="NanumBarunGothic" panose="020B0603020101020101" pitchFamily="34" charset="-127"/>
+              </a:rPr>
+              <a:t>-</a:t>
+            </a:r>
+            <a:r>
+              <a:rPr kumimoji="1" lang="ko-KR" altLang="en-US" sz="1200" dirty="0">
+                <a:latin typeface="NanumBarunGothic" panose="020B0603020101020101" pitchFamily="34" charset="-127"/>
+                <a:ea typeface="NanumBarunGothic" panose="020B0603020101020101" pitchFamily="34" charset="-127"/>
+              </a:rPr>
+              <a:t> 윤성</a:t>
             </a:r>
           </a:p>
         </p:txBody>
@@ -4554,7 +4799,7 @@
         </p:nvSpPr>
         <p:spPr>
           <a:xfrm>
-            <a:off x="534705" y="5036455"/>
+            <a:off x="534705" y="5174955"/>
             <a:ext cx="6077305" cy="1015663"/>
           </a:xfrm>
           <a:prstGeom prst="rect">
@@ -4766,10 +5011,411 @@
           </a:p>
         </p:txBody>
       </p:sp>
+      <p:sp>
+        <p:nvSpPr>
+          <p:cNvPr id="19" name="TextBox 18">
+            <a:extLst>
+              <a:ext uri="{FF2B5EF4-FFF2-40B4-BE49-F238E27FC236}">
+                <a16:creationId xmlns:a16="http://schemas.microsoft.com/office/drawing/2014/main" id="{2DA4A232-91AF-6E42-A883-B056CD8DCBCD}"/>
+              </a:ext>
+            </a:extLst>
+          </p:cNvPr>
+          <p:cNvSpPr txBox="1"/>
+          <p:nvPr/>
+        </p:nvSpPr>
+        <p:spPr>
+          <a:xfrm>
+            <a:off x="7111212" y="722585"/>
+            <a:ext cx="1863011" cy="276999"/>
+          </a:xfrm>
+          <a:prstGeom prst="rect">
+            <a:avLst/>
+          </a:prstGeom>
+          <a:noFill/>
+        </p:spPr>
+        <p:txBody>
+          <a:bodyPr wrap="none" rtlCol="0">
+            <a:spAutoFit/>
+          </a:bodyPr>
+          <a:lstStyle/>
+          <a:p>
+            <a:r>
+              <a:rPr kumimoji="1" lang="en-US" altLang="ko-KR" sz="1200" dirty="0">
+                <a:latin typeface="NanumBarunGothic" panose="020B0603020101020101" pitchFamily="34" charset="-127"/>
+                <a:ea typeface="NanumBarunGothic" panose="020B0603020101020101" pitchFamily="34" charset="-127"/>
+              </a:rPr>
+              <a:t>NH API </a:t>
+            </a:r>
+            <a:r>
+              <a:rPr kumimoji="1" lang="ko-KR" altLang="en-US" sz="1200" dirty="0" err="1">
+                <a:latin typeface="NanumBarunGothic" panose="020B0603020101020101" pitchFamily="34" charset="-127"/>
+                <a:ea typeface="NanumBarunGothic" panose="020B0603020101020101" pitchFamily="34" charset="-127"/>
+              </a:rPr>
+              <a:t>메뉴얼</a:t>
+            </a:r>
+            <a:r>
+              <a:rPr kumimoji="1" lang="ko-KR" altLang="en-US" sz="1200" dirty="0">
+                <a:latin typeface="NanumBarunGothic" panose="020B0603020101020101" pitchFamily="34" charset="-127"/>
+                <a:ea typeface="NanumBarunGothic" panose="020B0603020101020101" pitchFamily="34" charset="-127"/>
+              </a:rPr>
+              <a:t> 숙지 </a:t>
+            </a:r>
+            <a:r>
+              <a:rPr kumimoji="1" lang="en-US" altLang="ko-KR" sz="1200" dirty="0">
+                <a:latin typeface="NanumBarunGothic" panose="020B0603020101020101" pitchFamily="34" charset="-127"/>
+                <a:ea typeface="NanumBarunGothic" panose="020B0603020101020101" pitchFamily="34" charset="-127"/>
+              </a:rPr>
+              <a:t>-</a:t>
+            </a:r>
+            <a:r>
+              <a:rPr kumimoji="1" lang="ko-KR" altLang="en-US" sz="1200" dirty="0">
+                <a:latin typeface="NanumBarunGothic" panose="020B0603020101020101" pitchFamily="34" charset="-127"/>
+                <a:ea typeface="NanumBarunGothic" panose="020B0603020101020101" pitchFamily="34" charset="-127"/>
+              </a:rPr>
+              <a:t> 윤성</a:t>
+            </a:r>
+          </a:p>
+        </p:txBody>
+      </p:sp>
+      <p:sp>
+        <p:nvSpPr>
+          <p:cNvPr id="23" name="TextBox 22">
+            <a:extLst>
+              <a:ext uri="{FF2B5EF4-FFF2-40B4-BE49-F238E27FC236}">
+                <a16:creationId xmlns:a16="http://schemas.microsoft.com/office/drawing/2014/main" id="{832AA249-0807-D248-BAF0-C719D049FACF}"/>
+              </a:ext>
+            </a:extLst>
+          </p:cNvPr>
+          <p:cNvSpPr txBox="1"/>
+          <p:nvPr/>
+        </p:nvSpPr>
+        <p:spPr>
+          <a:xfrm>
+            <a:off x="245865" y="307086"/>
+            <a:ext cx="3796232" cy="646331"/>
+          </a:xfrm>
+          <a:prstGeom prst="rect">
+            <a:avLst/>
+          </a:prstGeom>
+          <a:noFill/>
+        </p:spPr>
+        <p:txBody>
+          <a:bodyPr wrap="none" rtlCol="0">
+            <a:spAutoFit/>
+          </a:bodyPr>
+          <a:lstStyle/>
+          <a:p>
+            <a:r>
+              <a:rPr kumimoji="1" lang="en-US" altLang="ko-KR" sz="1200" dirty="0">
+                <a:latin typeface="NanumBarunGothic" panose="020B0603020101020101" pitchFamily="34" charset="-127"/>
+                <a:ea typeface="NanumBarunGothic" panose="020B0603020101020101" pitchFamily="34" charset="-127"/>
+              </a:rPr>
+              <a:t>Tomcat, Data(Bank)</a:t>
+            </a:r>
+            <a:r>
+              <a:rPr kumimoji="1" lang="ko-KR" altLang="en-US" sz="1200" dirty="0">
+                <a:latin typeface="NanumBarunGothic" panose="020B0603020101020101" pitchFamily="34" charset="-127"/>
+                <a:ea typeface="NanumBarunGothic" panose="020B0603020101020101" pitchFamily="34" charset="-127"/>
+              </a:rPr>
+              <a:t>는 한 서버에서 운용됨</a:t>
+            </a:r>
+            <a:endParaRPr kumimoji="1" lang="en-US" altLang="ko-KR" sz="1200" dirty="0">
+              <a:latin typeface="NanumBarunGothic" panose="020B0603020101020101" pitchFamily="34" charset="-127"/>
+              <a:ea typeface="NanumBarunGothic" panose="020B0603020101020101" pitchFamily="34" charset="-127"/>
+            </a:endParaRPr>
+          </a:p>
+          <a:p>
+            <a:r>
+              <a:rPr kumimoji="1" lang="en-US" altLang="ko-KR" sz="1200" dirty="0">
+                <a:latin typeface="NanumBarunGothic" panose="020B0603020101020101" pitchFamily="34" charset="-127"/>
+                <a:ea typeface="NanumBarunGothic" panose="020B0603020101020101" pitchFamily="34" charset="-127"/>
+              </a:rPr>
+              <a:t>spark</a:t>
+            </a:r>
+            <a:r>
+              <a:rPr kumimoji="1" lang="ko-KR" altLang="en-US" sz="1200" dirty="0">
+                <a:latin typeface="NanumBarunGothic" panose="020B0603020101020101" pitchFamily="34" charset="-127"/>
+                <a:ea typeface="NanumBarunGothic" panose="020B0603020101020101" pitchFamily="34" charset="-127"/>
+              </a:rPr>
+              <a:t>와 같은 </a:t>
+            </a:r>
+            <a:r>
+              <a:rPr kumimoji="1" lang="ko-KR" altLang="en-US" sz="1200" dirty="0" err="1">
+                <a:latin typeface="NanumBarunGothic" panose="020B0603020101020101" pitchFamily="34" charset="-127"/>
+                <a:ea typeface="NanumBarunGothic" panose="020B0603020101020101" pitchFamily="34" charset="-127"/>
+              </a:rPr>
+              <a:t>연산처리는</a:t>
+            </a:r>
+            <a:r>
+              <a:rPr kumimoji="1" lang="ko-KR" altLang="en-US" sz="1200" dirty="0">
+                <a:latin typeface="NanumBarunGothic" panose="020B0603020101020101" pitchFamily="34" charset="-127"/>
+                <a:ea typeface="NanumBarunGothic" panose="020B0603020101020101" pitchFamily="34" charset="-127"/>
+              </a:rPr>
+              <a:t> 타 노드에서 진행 후 업로드 예정</a:t>
+            </a:r>
+            <a:endParaRPr kumimoji="1" lang="en-US" altLang="ko-KR" sz="1200" dirty="0">
+              <a:latin typeface="NanumBarunGothic" panose="020B0603020101020101" pitchFamily="34" charset="-127"/>
+              <a:ea typeface="NanumBarunGothic" panose="020B0603020101020101" pitchFamily="34" charset="-127"/>
+            </a:endParaRPr>
+          </a:p>
+          <a:p>
+            <a:r>
+              <a:rPr kumimoji="1" lang="ko-KR" altLang="en-US" sz="1200" dirty="0">
+                <a:latin typeface="NanumBarunGothic" panose="020B0603020101020101" pitchFamily="34" charset="-127"/>
+                <a:ea typeface="NanumBarunGothic" panose="020B0603020101020101" pitchFamily="34" charset="-127"/>
+              </a:rPr>
+              <a:t>보여주기 형태의 대시보드 구성 고려 </a:t>
+            </a:r>
+            <a:r>
+              <a:rPr kumimoji="1" lang="en-US" altLang="ko-KR" sz="1200" dirty="0">
+                <a:latin typeface="NanumBarunGothic" panose="020B0603020101020101" pitchFamily="34" charset="-127"/>
+                <a:ea typeface="NanumBarunGothic" panose="020B0603020101020101" pitchFamily="34" charset="-127"/>
+              </a:rPr>
+              <a:t>-&gt;</a:t>
+            </a:r>
+            <a:r>
+              <a:rPr kumimoji="1" lang="ko-KR" altLang="en-US" sz="1200" dirty="0">
+                <a:latin typeface="NanumBarunGothic" panose="020B0603020101020101" pitchFamily="34" charset="-127"/>
+                <a:ea typeface="NanumBarunGothic" panose="020B0603020101020101" pitchFamily="34" charset="-127"/>
+              </a:rPr>
+              <a:t> 데이터 시각화 관련</a:t>
+            </a:r>
+            <a:endParaRPr kumimoji="1" lang="en-US" altLang="ko-KR" sz="1200" dirty="0">
+              <a:latin typeface="NanumBarunGothic" panose="020B0603020101020101" pitchFamily="34" charset="-127"/>
+              <a:ea typeface="NanumBarunGothic" panose="020B0603020101020101" pitchFamily="34" charset="-127"/>
+            </a:endParaRPr>
+          </a:p>
+        </p:txBody>
+      </p:sp>
+      <p:sp>
+        <p:nvSpPr>
+          <p:cNvPr id="24" name="직사각형 23">
+            <a:extLst>
+              <a:ext uri="{FF2B5EF4-FFF2-40B4-BE49-F238E27FC236}">
+                <a16:creationId xmlns:a16="http://schemas.microsoft.com/office/drawing/2014/main" id="{66869DDB-7E31-8F46-9514-BD2E823FE744}"/>
+              </a:ext>
+            </a:extLst>
+          </p:cNvPr>
+          <p:cNvSpPr/>
+          <p:nvPr/>
+        </p:nvSpPr>
+        <p:spPr>
+          <a:xfrm>
+            <a:off x="10081042" y="827991"/>
+            <a:ext cx="1552557" cy="707395"/>
+          </a:xfrm>
+          <a:prstGeom prst="rect">
+            <a:avLst/>
+          </a:prstGeom>
+          <a:noFill/>
+          <a:ln w="38100">
+            <a:solidFill>
+              <a:schemeClr val="tx1"/>
+            </a:solidFill>
+          </a:ln>
+        </p:spPr>
+        <p:style>
+          <a:lnRef idx="2">
+            <a:schemeClr val="accent1">
+              <a:shade val="50000"/>
+            </a:schemeClr>
+          </a:lnRef>
+          <a:fillRef idx="1">
+            <a:schemeClr val="accent1"/>
+          </a:fillRef>
+          <a:effectRef idx="0">
+            <a:schemeClr val="accent1"/>
+          </a:effectRef>
+          <a:fontRef idx="minor">
+            <a:schemeClr val="lt1"/>
+          </a:fontRef>
+        </p:style>
+        <p:txBody>
+          <a:bodyPr rtlCol="0" anchor="ctr"/>
+          <a:lstStyle/>
+          <a:p>
+            <a:pPr algn="ctr"/>
+            <a:r>
+              <a:rPr kumimoji="1" lang="en-US" altLang="ko-KR" sz="1300" dirty="0" err="1">
+                <a:solidFill>
+                  <a:schemeClr val="tx1"/>
+                </a:solidFill>
+                <a:latin typeface="NanumBarunGothic" panose="020B0603020101020101" pitchFamily="34" charset="-127"/>
+                <a:ea typeface="NanumBarunGothic" panose="020B0603020101020101" pitchFamily="34" charset="-127"/>
+              </a:rPr>
+              <a:t>DashBoard</a:t>
+            </a:r>
+            <a:endParaRPr kumimoji="1" lang="en-US" altLang="ko-KR" sz="1300" dirty="0">
+              <a:solidFill>
+                <a:schemeClr val="tx1"/>
+              </a:solidFill>
+              <a:latin typeface="NanumBarunGothic" panose="020B0603020101020101" pitchFamily="34" charset="-127"/>
+              <a:ea typeface="NanumBarunGothic" panose="020B0603020101020101" pitchFamily="34" charset="-127"/>
+            </a:endParaRPr>
+          </a:p>
+        </p:txBody>
+      </p:sp>
     </p:spTree>
     <p:extLst>
       <p:ext uri="{BB962C8B-B14F-4D97-AF65-F5344CB8AC3E}">
         <p14:creationId xmlns:p14="http://schemas.microsoft.com/office/powerpoint/2010/main" val="2182937072"/>
+      </p:ext>
+    </p:extLst>
+  </p:cSld>
+  <p:clrMapOvr>
+    <a:masterClrMapping/>
+  </p:clrMapOvr>
+</p:sld>
+</file>
+
+<file path=ppt/slides/slide2.xml><?xml version="1.0" encoding="utf-8"?>
+<p:sld xmlns:a="http://schemas.openxmlformats.org/drawingml/2006/main" xmlns:r="http://schemas.openxmlformats.org/officeDocument/2006/relationships" xmlns:p="http://schemas.openxmlformats.org/presentationml/2006/main">
+  <p:cSld>
+    <p:spTree>
+      <p:nvGrpSpPr>
+        <p:cNvPr id="1" name=""/>
+        <p:cNvGrpSpPr/>
+        <p:nvPr/>
+      </p:nvGrpSpPr>
+      <p:grpSpPr>
+        <a:xfrm>
+          <a:off x="0" y="0"/>
+          <a:ext cx="0" cy="0"/>
+          <a:chOff x="0" y="0"/>
+          <a:chExt cx="0" cy="0"/>
+        </a:xfrm>
+      </p:grpSpPr>
+      <p:sp>
+        <p:nvSpPr>
+          <p:cNvPr id="19" name="TextBox 18">
+            <a:extLst>
+              <a:ext uri="{FF2B5EF4-FFF2-40B4-BE49-F238E27FC236}">
+                <a16:creationId xmlns:a16="http://schemas.microsoft.com/office/drawing/2014/main" id="{B9E9A3B6-5541-8C42-99E3-0DBE72D71C8E}"/>
+              </a:ext>
+            </a:extLst>
+          </p:cNvPr>
+          <p:cNvSpPr txBox="1"/>
+          <p:nvPr/>
+        </p:nvSpPr>
+        <p:spPr>
+          <a:xfrm>
+            <a:off x="245865" y="307086"/>
+            <a:ext cx="4224233" cy="1384995"/>
+          </a:xfrm>
+          <a:prstGeom prst="rect">
+            <a:avLst/>
+          </a:prstGeom>
+          <a:noFill/>
+        </p:spPr>
+        <p:txBody>
+          <a:bodyPr wrap="none" rtlCol="0">
+            <a:spAutoFit/>
+          </a:bodyPr>
+          <a:lstStyle/>
+          <a:p>
+            <a:r>
+              <a:rPr kumimoji="1" lang="ko-KR" altLang="en-US" sz="1200" dirty="0">
+                <a:latin typeface="NanumBarunGothic" panose="020B0603020101020101" pitchFamily="34" charset="-127"/>
+                <a:ea typeface="NanumBarunGothic" panose="020B0603020101020101" pitchFamily="34" charset="-127"/>
+              </a:rPr>
+              <a:t>데이터 통신 관련</a:t>
+            </a:r>
+            <a:endParaRPr kumimoji="1" lang="en-US" altLang="ko-KR" sz="1200" dirty="0">
+              <a:latin typeface="NanumBarunGothic" panose="020B0603020101020101" pitchFamily="34" charset="-127"/>
+              <a:ea typeface="NanumBarunGothic" panose="020B0603020101020101" pitchFamily="34" charset="-127"/>
+            </a:endParaRPr>
+          </a:p>
+          <a:p>
+            <a:r>
+              <a:rPr kumimoji="1" lang="ko-KR" altLang="en-US" sz="1200" dirty="0">
+                <a:latin typeface="NanumBarunGothic" panose="020B0603020101020101" pitchFamily="34" charset="-127"/>
+                <a:ea typeface="NanumBarunGothic" panose="020B0603020101020101" pitchFamily="34" charset="-127"/>
+              </a:rPr>
+              <a:t>같은 네트워크 상에 있지 않는 이상 정상적인 데이터 교환이 어려움</a:t>
+            </a:r>
+            <a:endParaRPr kumimoji="1" lang="en-US" altLang="ko-KR" sz="1200" dirty="0">
+              <a:latin typeface="NanumBarunGothic" panose="020B0603020101020101" pitchFamily="34" charset="-127"/>
+              <a:ea typeface="NanumBarunGothic" panose="020B0603020101020101" pitchFamily="34" charset="-127"/>
+            </a:endParaRPr>
+          </a:p>
+          <a:p>
+            <a:endParaRPr kumimoji="1" lang="en-US" altLang="ko-KR" sz="1200" dirty="0">
+              <a:latin typeface="NanumBarunGothic" panose="020B0603020101020101" pitchFamily="34" charset="-127"/>
+              <a:ea typeface="NanumBarunGothic" panose="020B0603020101020101" pitchFamily="34" charset="-127"/>
+            </a:endParaRPr>
+          </a:p>
+          <a:p>
+            <a:r>
+              <a:rPr kumimoji="1" lang="ko-KR" altLang="en-US" sz="1200" dirty="0">
+                <a:latin typeface="NanumBarunGothic" panose="020B0603020101020101" pitchFamily="34" charset="-127"/>
+                <a:ea typeface="NanumBarunGothic" panose="020B0603020101020101" pitchFamily="34" charset="-127"/>
+              </a:rPr>
+              <a:t>특정 </a:t>
+            </a:r>
+            <a:r>
+              <a:rPr kumimoji="1" lang="en-US" altLang="ko-KR" sz="1200" dirty="0">
+                <a:latin typeface="NanumBarunGothic" panose="020B0603020101020101" pitchFamily="34" charset="-127"/>
+                <a:ea typeface="NanumBarunGothic" panose="020B0603020101020101" pitchFamily="34" charset="-127"/>
+              </a:rPr>
+              <a:t>VPN</a:t>
+            </a:r>
+            <a:r>
+              <a:rPr kumimoji="1" lang="ko-KR" altLang="en-US" sz="1200" dirty="0" err="1">
+                <a:latin typeface="NanumBarunGothic" panose="020B0603020101020101" pitchFamily="34" charset="-127"/>
+                <a:ea typeface="NanumBarunGothic" panose="020B0603020101020101" pitchFamily="34" charset="-127"/>
+              </a:rPr>
+              <a:t>으로</a:t>
+            </a:r>
+            <a:r>
+              <a:rPr kumimoji="1" lang="ko-KR" altLang="en-US" sz="1200" dirty="0">
+                <a:latin typeface="NanumBarunGothic" panose="020B0603020101020101" pitchFamily="34" charset="-127"/>
+                <a:ea typeface="NanumBarunGothic" panose="020B0603020101020101" pitchFamily="34" charset="-127"/>
+              </a:rPr>
+              <a:t> 내부 네트워크 연결 필요</a:t>
+            </a:r>
+            <a:endParaRPr kumimoji="1" lang="en-US" altLang="ko-KR" sz="1200" dirty="0">
+              <a:latin typeface="NanumBarunGothic" panose="020B0603020101020101" pitchFamily="34" charset="-127"/>
+              <a:ea typeface="NanumBarunGothic" panose="020B0603020101020101" pitchFamily="34" charset="-127"/>
+            </a:endParaRPr>
+          </a:p>
+          <a:p>
+            <a:r>
+              <a:rPr kumimoji="1" lang="en-US" altLang="ko-KR" sz="1200" dirty="0">
+                <a:latin typeface="NanumBarunGothic" panose="020B0603020101020101" pitchFamily="34" charset="-127"/>
+                <a:ea typeface="NanumBarunGothic" panose="020B0603020101020101" pitchFamily="34" charset="-127"/>
+              </a:rPr>
+              <a:t>-&gt;</a:t>
+            </a:r>
+            <a:r>
+              <a:rPr kumimoji="1" lang="ko-KR" altLang="en-US" sz="1200" dirty="0">
+                <a:latin typeface="NanumBarunGothic" panose="020B0603020101020101" pitchFamily="34" charset="-127"/>
+                <a:ea typeface="NanumBarunGothic" panose="020B0603020101020101" pitchFamily="34" charset="-127"/>
+              </a:rPr>
+              <a:t> 공유기 사용 고려</a:t>
+            </a:r>
+            <a:endParaRPr kumimoji="1" lang="en-US" altLang="ko-KR" sz="1200" dirty="0">
+              <a:latin typeface="NanumBarunGothic" panose="020B0603020101020101" pitchFamily="34" charset="-127"/>
+              <a:ea typeface="NanumBarunGothic" panose="020B0603020101020101" pitchFamily="34" charset="-127"/>
+            </a:endParaRPr>
+          </a:p>
+          <a:p>
+            <a:endParaRPr kumimoji="1" lang="en-US" altLang="ko-KR" sz="1200" dirty="0">
+              <a:latin typeface="NanumBarunGothic" panose="020B0603020101020101" pitchFamily="34" charset="-127"/>
+              <a:ea typeface="NanumBarunGothic" panose="020B0603020101020101" pitchFamily="34" charset="-127"/>
+            </a:endParaRPr>
+          </a:p>
+          <a:p>
+            <a:endParaRPr kumimoji="1" lang="en-US" altLang="ko-KR" sz="1200" dirty="0">
+              <a:latin typeface="NanumBarunGothic" panose="020B0603020101020101" pitchFamily="34" charset="-127"/>
+              <a:ea typeface="NanumBarunGothic" panose="020B0603020101020101" pitchFamily="34" charset="-127"/>
+            </a:endParaRPr>
+          </a:p>
+        </p:txBody>
+      </p:sp>
+    </p:spTree>
+    <p:extLst>
+      <p:ext uri="{BB962C8B-B14F-4D97-AF65-F5344CB8AC3E}">
+        <p14:creationId xmlns:p14="http://schemas.microsoft.com/office/powerpoint/2010/main" val="1806344537"/>
       </p:ext>
     </p:extLst>
   </p:cSld>

</xml_diff>